<commit_message>
Add reporter slides #2, moved verbose after default
</commit_message>
<xml_diff>
--- a/typescript_unit_testing_with_vitest.pptx
+++ b/typescript_unit_testing_with_vitest.pptx
@@ -29,9 +29,9 @@
     <p:sldId id="390" r:id="rId23"/>
     <p:sldId id="396" r:id="rId24"/>
     <p:sldId id="391" r:id="rId25"/>
-    <p:sldId id="392" r:id="rId26"/>
-    <p:sldId id="394" r:id="rId27"/>
-    <p:sldId id="393" r:id="rId28"/>
+    <p:sldId id="393" r:id="rId26"/>
+    <p:sldId id="392" r:id="rId27"/>
+    <p:sldId id="394" r:id="rId28"/>
     <p:sldId id="397" r:id="rId29"/>
     <p:sldId id="395" r:id="rId30"/>
     <p:sldId id="398" r:id="rId31"/>
@@ -13673,6 +13673,25 @@
               <a:t> </a:t>
             </a:r>
             <a:r>
+              <a:rPr lang="nl-NL" dirty="0">
+                <a:solidFill>
+                  <a:srgbClr val="005CC5"/>
+                </a:solidFill>
+                <a:latin typeface="ui-monospace"/>
+              </a:rPr>
+              <a:t>--</a:t>
+            </a:r>
+            <a:r>
+              <a:rPr lang="nl-NL" b="0" dirty="0" err="1">
+                <a:solidFill>
+                  <a:srgbClr val="005CC5"/>
+                </a:solidFill>
+                <a:effectLst/>
+                <a:latin typeface="ui-monospace"/>
+              </a:rPr>
+              <a:t>outputFile.junit</a:t>
+            </a:r>
+            <a:r>
               <a:rPr lang="nl-NL" b="0" dirty="0">
                 <a:solidFill>
                   <a:srgbClr val="005CC5"/>
@@ -13680,7 +13699,55 @@
                 <a:effectLst/>
                 <a:latin typeface="ui-monospace"/>
               </a:rPr>
-              <a:t>–</a:t>
+              <a:t>=./junit-report.</a:t>
+            </a:r>
+            <a:r>
+              <a:rPr lang="nl-NL" b="0">
+                <a:solidFill>
+                  <a:srgbClr val="005CC5"/>
+                </a:solidFill>
+                <a:effectLst/>
+                <a:latin typeface="ui-monospace"/>
+              </a:rPr>
+              <a:t>xml </a:t>
+            </a:r>
+            <a:r>
+              <a:rPr lang="nl-NL" b="0">
+                <a:solidFill>
+                  <a:srgbClr val="0070C0"/>
+                </a:solidFill>
+                <a:effectLst/>
+                <a:latin typeface="ui-monospace"/>
+              </a:rPr>
+              <a:t> </a:t>
+            </a:r>
+            <a:r>
+              <a:rPr lang="nl-NL">
+                <a:solidFill>
+                  <a:srgbClr val="005CC5"/>
+                </a:solidFill>
+                <a:latin typeface="ui-monospace"/>
+              </a:rPr>
+              <a:t>-</a:t>
+            </a:r>
+            <a:r>
+              <a:rPr lang="nl-NL" dirty="0">
+                <a:solidFill>
+                  <a:srgbClr val="005CC5"/>
+                </a:solidFill>
+                <a:latin typeface="ui-monospace"/>
+              </a:rPr>
+              <a:t>-</a:t>
+            </a:r>
+            <a:r>
+              <a:rPr lang="nl-NL" b="0">
+                <a:solidFill>
+                  <a:srgbClr val="005CC5"/>
+                </a:solidFill>
+                <a:effectLst/>
+                <a:latin typeface="ui-monospace"/>
+              </a:rPr>
+              <a:t>outputFile</a:t>
             </a:r>
             <a:r>
               <a:rPr lang="nl-NL" b="0" dirty="0" err="1">
@@ -13690,47 +13757,7 @@
                 <a:effectLst/>
                 <a:latin typeface="ui-monospace"/>
               </a:rPr>
-              <a:t>outputFile.junit</a:t>
-            </a:r>
-            <a:r>
-              <a:rPr lang="nl-NL" b="0" dirty="0">
-                <a:solidFill>
-                  <a:srgbClr val="005CC5"/>
-                </a:solidFill>
-                <a:effectLst/>
-                <a:latin typeface="ui-monospace"/>
-              </a:rPr>
-              <a:t>=./junit-report.xml </a:t>
-            </a:r>
-            <a:r>
-              <a:rPr lang="nl-NL" b="0" dirty="0">
-                <a:solidFill>
-                  <a:srgbClr val="0070C0"/>
-                </a:solidFill>
-                <a:effectLst/>
-                <a:latin typeface="ui-monospace"/>
-              </a:rPr>
-              <a:t> </a:t>
-            </a:r>
-            <a:r>
-              <a:rPr lang="nl-NL" b="0" dirty="0">
-                <a:solidFill>
-                  <a:srgbClr val="005CC5"/>
-                </a:solidFill>
-                <a:effectLst/>
-                <a:latin typeface="ui-monospace"/>
-              </a:rPr>
-              <a:t>–</a:t>
-            </a:r>
-            <a:r>
-              <a:rPr lang="nl-NL" b="0" dirty="0" err="1">
-                <a:solidFill>
-                  <a:srgbClr val="005CC5"/>
-                </a:solidFill>
-                <a:effectLst/>
-                <a:latin typeface="ui-monospace"/>
-              </a:rPr>
-              <a:t>outputFile.json</a:t>
+              <a:t>.json</a:t>
             </a:r>
             <a:r>
               <a:rPr lang="nl-NL" b="0" dirty="0">
@@ -14748,7 +14775,7 @@
           <a:p>
             <a:r>
               <a:rPr lang="en-US" dirty="0"/>
-              <a:t>Built-in reporters: Basic</a:t>
+              <a:t>Built-in reporters: Verbose</a:t>
             </a:r>
             <a:endParaRPr lang="nl-NL" dirty="0"/>
           </a:p>
@@ -14773,12 +14800,12 @@
         <p:spPr>
           <a:xfrm>
             <a:off x="720004" y="935999"/>
-            <a:ext cx="6623996" cy="1999125"/>
+            <a:ext cx="7034108" cy="3219035"/>
           </a:xfrm>
         </p:spPr>
         <p:txBody>
           <a:bodyPr>
-            <a:normAutofit fontScale="85000" lnSpcReduction="20000"/>
+            <a:normAutofit fontScale="77500" lnSpcReduction="20000"/>
           </a:bodyPr>
           <a:lstStyle/>
           <a:p>
@@ -14790,7 +14817,7 @@
                 <a:effectLst/>
                 <a:latin typeface="+mj-lt"/>
               </a:rPr>
-              <a:t>Displays the test files that have run and a summary of results after the entire suite has finished running.</a:t>
+              <a:t>Same as Default without collapsing the subtrees.</a:t>
             </a:r>
           </a:p>
           <a:p>
@@ -14802,7 +14829,7 @@
                 <a:effectLst/>
                 <a:latin typeface="+mj-lt"/>
               </a:rPr>
-              <a:t>Individual tests are only included in the report when they fail.</a:t>
+              <a:t>Individual tests are included in the report passed as well as failed.</a:t>
             </a:r>
           </a:p>
           <a:p>
@@ -14819,62 +14846,172 @@
               <a:buNone/>
             </a:pPr>
             <a:r>
-              <a:rPr lang="nl-NL" b="0" i="0" dirty="0">
-                <a:effectLst/>
+              <a:rPr lang="en-US" dirty="0">
                 <a:latin typeface="ui-monospace"/>
               </a:rPr>
-              <a:t>	✓ __tests__/file1.test.ts (2) 725ms</a:t>
-            </a:r>
+              <a:t>	</a:t>
+            </a:r>
+            <a:r>
+              <a:rPr lang="en-US" b="0" i="0" dirty="0">
+                <a:effectLst/>
+                <a:latin typeface="ui-monospace"/>
+              </a:rPr>
+              <a:t>✓ __tests__/file1.test.ts (2) 725ms </a:t>
+            </a:r>
+          </a:p>
+          <a:p>
+            <a:pPr marL="180000" lvl="1" indent="0">
+              <a:buNone/>
+            </a:pPr>
+            <a:r>
+              <a:rPr lang="en-US" b="0" i="0" dirty="0">
+                <a:effectLst/>
+                <a:latin typeface="ui-monospace"/>
+              </a:rPr>
+              <a:t>	</a:t>
+            </a:r>
+            <a:r>
+              <a:rPr lang="en-US" dirty="0">
+                <a:latin typeface="ui-monospace"/>
+              </a:rPr>
+              <a:t>    </a:t>
+            </a:r>
+            <a:r>
+              <a:rPr lang="en-US" b="0" i="0" dirty="0">
+                <a:effectLst/>
+                <a:latin typeface="ui-monospace"/>
+              </a:rPr>
+              <a:t>✓ second test file (2) 746ms </a:t>
+            </a:r>
+          </a:p>
+          <a:p>
+            <a:pPr marL="180000" lvl="1" indent="0">
+              <a:buNone/>
+            </a:pPr>
+            <a:r>
+              <a:rPr lang="en-US" dirty="0">
+                <a:latin typeface="ui-monospace"/>
+              </a:rPr>
+              <a:t>	        </a:t>
+            </a:r>
+            <a:r>
+              <a:rPr lang="en-US" b="0" i="0" dirty="0">
+                <a:effectLst/>
+                <a:latin typeface="ui-monospace"/>
+              </a:rPr>
+              <a:t>✓ 1 + 1 should equal 2 </a:t>
+            </a:r>
+          </a:p>
+          <a:p>
+            <a:pPr marL="180000" lvl="1" indent="0">
+              <a:buNone/>
+            </a:pPr>
+            <a:r>
+              <a:rPr lang="en-US" dirty="0">
+                <a:latin typeface="ui-monospace"/>
+              </a:rPr>
+              <a:t>	        </a:t>
+            </a:r>
+            <a:r>
+              <a:rPr lang="en-US" b="0" i="0" dirty="0">
+                <a:effectLst/>
+                <a:latin typeface="ui-monospace"/>
+              </a:rPr>
+              <a:t>✓ 2 - 1 should equal 1</a:t>
+            </a:r>
+            <a:endParaRPr lang="en-US" dirty="0">
+              <a:solidFill>
+                <a:srgbClr val="3C3C43"/>
+              </a:solidFill>
+              <a:latin typeface="+mj-lt"/>
+            </a:endParaRPr>
           </a:p>
           <a:p>
             <a:pPr marL="0" indent="0">
               <a:buNone/>
             </a:pPr>
             <a:r>
-              <a:rPr lang="nl-NL" dirty="0">
+              <a:rPr lang="en-US" b="0" i="0" dirty="0">
+                <a:effectLst/>
                 <a:latin typeface="ui-monospace"/>
               </a:rPr>
+              <a:t>	✓ __tests__/file2.test.ts (5) 746ms</a:t>
+            </a:r>
+          </a:p>
+          <a:p>
+            <a:pPr marL="180000" lvl="1" indent="0">
+              <a:buNone/>
+            </a:pPr>
+            <a:r>
+              <a:rPr lang="en-US" b="0" i="0" dirty="0">
+                <a:effectLst/>
+                <a:latin typeface="ui-monospace"/>
+              </a:rPr>
               <a:t>	</a:t>
             </a:r>
             <a:r>
-              <a:rPr lang="nl-NL" b="0" i="0" dirty="0">
-                <a:effectLst/>
+              <a:rPr lang="en-US" dirty="0">
                 <a:latin typeface="ui-monospace"/>
               </a:rPr>
-              <a:t>✓ __tests__/file2.test.ts (2) 746ms</a:t>
-            </a:r>
+              <a:t>    </a:t>
+            </a:r>
+            <a:r>
+              <a:rPr lang="en-US" b="0" i="0" dirty="0">
+                <a:effectLst/>
+                <a:latin typeface="ui-monospace"/>
+              </a:rPr>
+              <a:t>✓ second test file (2) 746ms </a:t>
+            </a:r>
+          </a:p>
+          <a:p>
+            <a:pPr marL="180000" lvl="1" indent="0">
+              <a:buNone/>
+            </a:pPr>
+            <a:r>
+              <a:rPr lang="en-US" dirty="0">
+                <a:latin typeface="ui-monospace"/>
+              </a:rPr>
+              <a:t>	        </a:t>
+            </a:r>
+            <a:r>
+              <a:rPr lang="en-US" b="0" i="0" dirty="0">
+                <a:effectLst/>
+                <a:latin typeface="ui-monospace"/>
+              </a:rPr>
+              <a:t>✓ 1 + 1 should equal 2 </a:t>
+            </a:r>
+          </a:p>
+          <a:p>
+            <a:pPr marL="180000" lvl="1" indent="0">
+              <a:buNone/>
+            </a:pPr>
+            <a:r>
+              <a:rPr lang="en-US" dirty="0">
+                <a:latin typeface="ui-monospace"/>
+              </a:rPr>
+              <a:t>	        </a:t>
+            </a:r>
+            <a:r>
+              <a:rPr lang="en-US" b="0" i="0" dirty="0">
+                <a:effectLst/>
+                <a:latin typeface="ui-monospace"/>
+              </a:rPr>
+              <a:t>✓ 2 - 1 should equal 1</a:t>
+            </a:r>
+            <a:endParaRPr lang="en-US" dirty="0">
+              <a:solidFill>
+                <a:srgbClr val="3C3C43"/>
+              </a:solidFill>
+              <a:latin typeface="+mj-lt"/>
+            </a:endParaRPr>
           </a:p>
           <a:p>
             <a:pPr marL="0" indent="0">
               <a:buNone/>
             </a:pPr>
-            <a:r>
-              <a:rPr lang="nl-NL" dirty="0">
-                <a:latin typeface="ui-monospace"/>
-              </a:rPr>
-              <a:t>	  </a:t>
-            </a:r>
-            <a:r>
-              <a:rPr lang="nl-NL" b="0" i="0" dirty="0">
-                <a:effectLst/>
-                <a:latin typeface="ui-monospace"/>
-              </a:rPr>
-              <a:t>Test Files 2 </a:t>
-            </a:r>
-            <a:r>
-              <a:rPr lang="nl-NL" b="0" i="0" dirty="0" err="1">
-                <a:effectLst/>
-                <a:latin typeface="ui-monospace"/>
-              </a:rPr>
-              <a:t>passed</a:t>
-            </a:r>
-            <a:r>
-              <a:rPr lang="nl-NL" b="0" i="0" dirty="0">
-                <a:effectLst/>
-                <a:latin typeface="ui-monospace"/>
-              </a:rPr>
-              <a:t> (2)</a:t>
-            </a:r>
+            <a:endParaRPr lang="nl-NL" dirty="0">
+              <a:latin typeface="ui-monospace"/>
+            </a:endParaRPr>
           </a:p>
           <a:p>
             <a:pPr marL="0" indent="0">
@@ -14884,14 +15021,14 @@
               <a:rPr lang="nl-NL" dirty="0">
                 <a:latin typeface="ui-monospace"/>
               </a:rPr>
-              <a:t>	          </a:t>
+              <a:t>	  </a:t>
             </a:r>
             <a:r>
               <a:rPr lang="nl-NL" b="0" i="0" dirty="0">
                 <a:effectLst/>
                 <a:latin typeface="ui-monospace"/>
               </a:rPr>
-              <a:t>Tests 4 </a:t>
+              <a:t>Test Files 2 </a:t>
             </a:r>
             <a:r>
               <a:rPr lang="nl-NL" b="0" i="0" dirty="0" err="1">
@@ -14905,7 +15042,7 @@
                 <a:effectLst/>
                 <a:latin typeface="ui-monospace"/>
               </a:rPr>
-              <a:t> (4)</a:t>
+              <a:t> (2)</a:t>
             </a:r>
           </a:p>
           <a:p>
@@ -14916,6 +15053,38 @@
               <a:rPr lang="nl-NL" dirty="0">
                 <a:latin typeface="ui-monospace"/>
               </a:rPr>
+              <a:t>	          </a:t>
+            </a:r>
+            <a:r>
+              <a:rPr lang="nl-NL" b="0" i="0" dirty="0">
+                <a:effectLst/>
+                <a:latin typeface="ui-monospace"/>
+              </a:rPr>
+              <a:t>Tests 4 </a:t>
+            </a:r>
+            <a:r>
+              <a:rPr lang="nl-NL" b="0" i="0" dirty="0" err="1">
+                <a:effectLst/>
+                <a:latin typeface="ui-monospace"/>
+              </a:rPr>
+              <a:t>passed</a:t>
+            </a:r>
+            <a:r>
+              <a:rPr lang="nl-NL" b="0" i="0" dirty="0">
+                <a:effectLst/>
+                <a:latin typeface="ui-monospace"/>
+              </a:rPr>
+              <a:t> (4)</a:t>
+            </a:r>
+          </a:p>
+          <a:p>
+            <a:pPr marL="0" indent="0">
+              <a:buNone/>
+            </a:pPr>
+            <a:r>
+              <a:rPr lang="nl-NL" dirty="0">
+                <a:latin typeface="ui-monospace"/>
+              </a:rPr>
               <a:t>	       </a:t>
             </a:r>
             <a:r>
@@ -14923,7 +15092,19 @@
                 <a:effectLst/>
                 <a:latin typeface="ui-monospace"/>
               </a:rPr>
-              <a:t>Start at 12:34:32 </a:t>
+              <a:t>Start at 12:34:32</a:t>
+            </a:r>
+          </a:p>
+          <a:p>
+            <a:pPr marL="0" indent="0">
+              <a:buNone/>
+            </a:pPr>
+            <a:r>
+              <a:rPr lang="nl-NL" b="0" i="0" dirty="0">
+                <a:effectLst/>
+                <a:latin typeface="ui-monospace"/>
+              </a:rPr>
+              <a:t>	       </a:t>
             </a:r>
             <a:r>
               <a:rPr lang="nl-NL" b="0" i="0" dirty="0" err="1">
@@ -15013,7 +15194,7 @@
     </p:spTree>
     <p:extLst>
       <p:ext uri="{BB962C8B-B14F-4D97-AF65-F5344CB8AC3E}">
-        <p14:creationId xmlns:p14="http://schemas.microsoft.com/office/powerpoint/2010/main" val="1221538640"/>
+        <p14:creationId xmlns:p14="http://schemas.microsoft.com/office/powerpoint/2010/main" val="4239046025"/>
       </p:ext>
     </p:extLst>
   </p:cSld>
@@ -15063,7 +15244,7 @@
           <a:p>
             <a:r>
               <a:rPr lang="en-US" dirty="0"/>
-              <a:t>Built-in reporters: Dot</a:t>
+              <a:t>Built-in reporters: Basic</a:t>
             </a:r>
             <a:endParaRPr lang="nl-NL" dirty="0"/>
           </a:p>
@@ -15093,7 +15274,7 @@
         </p:spPr>
         <p:txBody>
           <a:bodyPr>
-            <a:normAutofit/>
+            <a:normAutofit fontScale="85000" lnSpcReduction="20000"/>
           </a:bodyPr>
           <a:lstStyle/>
           <a:p>
@@ -15105,40 +15286,58 @@
                 <a:effectLst/>
                 <a:latin typeface="+mj-lt"/>
               </a:rPr>
-              <a:t>Prints only a single dot for each completed test to provide minimal output</a:t>
-            </a:r>
-            <a:endParaRPr lang="en-US" dirty="0">
+              <a:t>Displays the test files that have run and a summary of results after the entire suite has finished running.</a:t>
+            </a:r>
+          </a:p>
+          <a:p>
+            <a:r>
+              <a:rPr lang="en-US" b="0" i="0" dirty="0">
+                <a:solidFill>
+                  <a:srgbClr val="3C3C43"/>
+                </a:solidFill>
+                <a:effectLst/>
+                <a:latin typeface="+mj-lt"/>
+              </a:rPr>
+              <a:t>Individual tests are only included in the report when they fail.</a:t>
+            </a:r>
+          </a:p>
+          <a:p>
+            <a:endParaRPr lang="en-US" b="0" i="0" dirty="0">
               <a:solidFill>
                 <a:srgbClr val="3C3C43"/>
               </a:solidFill>
+              <a:effectLst/>
               <a:latin typeface="+mj-lt"/>
             </a:endParaRPr>
           </a:p>
           <a:p>
-            <a:r>
-              <a:rPr lang="en-US" b="0" i="0" dirty="0">
-                <a:solidFill>
-                  <a:srgbClr val="3C3C43"/>
-                </a:solidFill>
-                <a:effectLst/>
-                <a:latin typeface="+mj-lt"/>
-              </a:rPr>
-              <a:t>Details are provided for failed tests, along with the basic reporter summary</a:t>
-            </a:r>
-          </a:p>
-          <a:p>
-            <a:pPr marL="540000" lvl="3" indent="0">
+            <a:pPr marL="0" indent="0">
               <a:buNone/>
             </a:pPr>
             <a:r>
-              <a:rPr lang="en-US" b="1" i="0" dirty="0">
-                <a:solidFill>
-                  <a:srgbClr val="3C3C43"/>
-                </a:solidFill>
-                <a:effectLst/>
-                <a:latin typeface="+mj-lt"/>
-              </a:rPr>
-              <a:t>. . . .</a:t>
+              <a:rPr lang="nl-NL" b="0" i="0" dirty="0">
+                <a:effectLst/>
+                <a:latin typeface="ui-monospace"/>
+              </a:rPr>
+              <a:t>	✓ __tests__/file1.test.ts (2) 725ms</a:t>
+            </a:r>
+          </a:p>
+          <a:p>
+            <a:pPr marL="0" indent="0">
+              <a:buNone/>
+            </a:pPr>
+            <a:r>
+              <a:rPr lang="nl-NL" dirty="0">
+                <a:latin typeface="ui-monospace"/>
+              </a:rPr>
+              <a:t>	</a:t>
+            </a:r>
+            <a:r>
+              <a:rPr lang="nl-NL" b="0" i="0" dirty="0">
+                <a:effectLst/>
+                <a:latin typeface="ui-monospace"/>
+              </a:rPr>
+              <a:t>✓ __tests__/file2.test.ts (2) 746ms</a:t>
             </a:r>
           </a:p>
           <a:p>
@@ -15310,7 +15509,7 @@
     </p:spTree>
     <p:extLst>
       <p:ext uri="{BB962C8B-B14F-4D97-AF65-F5344CB8AC3E}">
-        <p14:creationId xmlns:p14="http://schemas.microsoft.com/office/powerpoint/2010/main" val="3941090643"/>
+        <p14:creationId xmlns:p14="http://schemas.microsoft.com/office/powerpoint/2010/main" val="1221538640"/>
       </p:ext>
     </p:extLst>
   </p:cSld>
@@ -15360,7 +15559,7 @@
           <a:p>
             <a:r>
               <a:rPr lang="en-US" dirty="0"/>
-              <a:t>Built-in reporters: Verbose</a:t>
+              <a:t>Built-in reporters: Dot</a:t>
             </a:r>
             <a:endParaRPr lang="nl-NL" dirty="0"/>
           </a:p>
@@ -15385,12 +15584,12 @@
         <p:spPr>
           <a:xfrm>
             <a:off x="720004" y="935999"/>
-            <a:ext cx="7034108" cy="3219035"/>
+            <a:ext cx="6623996" cy="1999125"/>
           </a:xfrm>
         </p:spPr>
         <p:txBody>
           <a:bodyPr>
-            <a:normAutofit fontScale="77500" lnSpcReduction="20000"/>
+            <a:normAutofit/>
           </a:bodyPr>
           <a:lstStyle/>
           <a:p>
@@ -15402,107 +15601,7 @@
                 <a:effectLst/>
                 <a:latin typeface="+mj-lt"/>
               </a:rPr>
-              <a:t>Same as Default without collapsing the subtrees.</a:t>
-            </a:r>
-          </a:p>
-          <a:p>
-            <a:r>
-              <a:rPr lang="en-US" b="0" i="0" dirty="0">
-                <a:solidFill>
-                  <a:srgbClr val="3C3C43"/>
-                </a:solidFill>
-                <a:effectLst/>
-                <a:latin typeface="+mj-lt"/>
-              </a:rPr>
-              <a:t>Individual tests are included in the report passed as well as failed.</a:t>
-            </a:r>
-          </a:p>
-          <a:p>
-            <a:endParaRPr lang="en-US" b="0" i="0" dirty="0">
-              <a:solidFill>
-                <a:srgbClr val="3C3C43"/>
-              </a:solidFill>
-              <a:effectLst/>
-              <a:latin typeface="+mj-lt"/>
-            </a:endParaRPr>
-          </a:p>
-          <a:p>
-            <a:pPr marL="0" indent="0">
-              <a:buNone/>
-            </a:pPr>
-            <a:r>
-              <a:rPr lang="en-US" dirty="0">
-                <a:latin typeface="ui-monospace"/>
-              </a:rPr>
-              <a:t>	</a:t>
-            </a:r>
-            <a:r>
-              <a:rPr lang="en-US" b="0" i="0" dirty="0">
-                <a:effectLst/>
-                <a:latin typeface="ui-monospace"/>
-              </a:rPr>
-              <a:t>✓ __tests__/file1.test.ts (2) 725ms </a:t>
-            </a:r>
-          </a:p>
-          <a:p>
-            <a:pPr marL="180000" lvl="1" indent="0">
-              <a:buNone/>
-            </a:pPr>
-            <a:r>
-              <a:rPr lang="en-US" b="0" i="0" dirty="0">
-                <a:effectLst/>
-                <a:latin typeface="ui-monospace"/>
-              </a:rPr>
-              <a:t>	</a:t>
-            </a:r>
-            <a:r>
-              <a:rPr lang="en-US" dirty="0">
-                <a:latin typeface="ui-monospace"/>
-              </a:rPr>
-              <a:t>    </a:t>
-            </a:r>
-            <a:r>
-              <a:rPr lang="en-US" b="0" i="0" dirty="0">
-                <a:effectLst/>
-                <a:latin typeface="ui-monospace"/>
-              </a:rPr>
-              <a:t>✓ second test file (2) 746ms </a:t>
-            </a:r>
-          </a:p>
-          <a:p>
-            <a:pPr marL="180000" lvl="1" indent="0">
-              <a:buNone/>
-            </a:pPr>
-            <a:r>
-              <a:rPr lang="en-US" dirty="0">
-                <a:latin typeface="ui-monospace"/>
-              </a:rPr>
-              <a:t>	        </a:t>
-            </a:r>
-            <a:r>
-              <a:rPr lang="en-US" b="0" i="0" dirty="0">
-                <a:effectLst/>
-                <a:latin typeface="ui-monospace"/>
-              </a:rPr>
-              <a:t>✓ 1 + 1 should equal 2 </a:t>
-            </a:r>
-          </a:p>
-          <a:p>
-            <a:pPr marL="180000" lvl="1" indent="0">
-              <a:buNone/>
-            </a:pPr>
-            <a:r>
-              <a:rPr lang="en-US" dirty="0">
-                <a:latin typeface="ui-monospace"/>
-              </a:rPr>
-              <a:t>	        </a:t>
-            </a:r>
-            <a:r>
-              <a:rPr lang="en-US" b="0" i="0" dirty="0">
-                <a:effectLst/>
-                <a:latin typeface="ui-monospace"/>
-              </a:rPr>
-              <a:t>✓ 2 - 1 should equal 1</a:t>
+              <a:t>Prints only a single dot for each completed test to provide minimal output</a:t>
             </a:r>
             <a:endParaRPr lang="en-US" dirty="0">
               <a:solidFill>
@@ -15512,91 +15611,95 @@
             </a:endParaRPr>
           </a:p>
           <a:p>
+            <a:r>
+              <a:rPr lang="en-US" b="0" i="0" dirty="0">
+                <a:solidFill>
+                  <a:srgbClr val="3C3C43"/>
+                </a:solidFill>
+                <a:effectLst/>
+                <a:latin typeface="+mj-lt"/>
+              </a:rPr>
+              <a:t>Details are provided for failed tests, along with the basic reporter summary</a:t>
+            </a:r>
+          </a:p>
+          <a:p>
+            <a:pPr marL="540000" lvl="3" indent="0">
+              <a:buNone/>
+            </a:pPr>
+            <a:r>
+              <a:rPr lang="en-US" b="1" i="0" dirty="0">
+                <a:solidFill>
+                  <a:srgbClr val="3C3C43"/>
+                </a:solidFill>
+                <a:effectLst/>
+                <a:latin typeface="+mj-lt"/>
+              </a:rPr>
+              <a:t>. . . .</a:t>
+            </a:r>
+          </a:p>
+          <a:p>
             <a:pPr marL="0" indent="0">
               <a:buNone/>
             </a:pPr>
             <a:r>
-              <a:rPr lang="en-US" b="0" i="0" dirty="0">
-                <a:effectLst/>
+              <a:rPr lang="nl-NL" dirty="0">
                 <a:latin typeface="ui-monospace"/>
               </a:rPr>
-              <a:t>	✓ __tests__/file2.test.ts (5) 746ms</a:t>
-            </a:r>
-          </a:p>
-          <a:p>
-            <a:pPr marL="180000" lvl="1" indent="0">
-              <a:buNone/>
-            </a:pPr>
-            <a:r>
-              <a:rPr lang="en-US" b="0" i="0" dirty="0">
+              <a:t>	  </a:t>
+            </a:r>
+            <a:r>
+              <a:rPr lang="nl-NL" b="0" i="0" dirty="0">
                 <a:effectLst/>
                 <a:latin typeface="ui-monospace"/>
               </a:rPr>
-              <a:t>	</a:t>
-            </a:r>
-            <a:r>
-              <a:rPr lang="en-US" dirty="0">
+              <a:t>Test Files 2 </a:t>
+            </a:r>
+            <a:r>
+              <a:rPr lang="nl-NL" b="0" i="0" dirty="0" err="1">
+                <a:effectLst/>
                 <a:latin typeface="ui-monospace"/>
               </a:rPr>
-              <a:t>    </a:t>
-            </a:r>
-            <a:r>
-              <a:rPr lang="en-US" b="0" i="0" dirty="0">
+              <a:t>passed</a:t>
+            </a:r>
+            <a:r>
+              <a:rPr lang="nl-NL" b="0" i="0" dirty="0">
                 <a:effectLst/>
                 <a:latin typeface="ui-monospace"/>
               </a:rPr>
-              <a:t>✓ second test file (2) 746ms </a:t>
-            </a:r>
-          </a:p>
-          <a:p>
-            <a:pPr marL="180000" lvl="1" indent="0">
-              <a:buNone/>
-            </a:pPr>
-            <a:r>
-              <a:rPr lang="en-US" dirty="0">
-                <a:latin typeface="ui-monospace"/>
-              </a:rPr>
-              <a:t>	        </a:t>
-            </a:r>
-            <a:r>
-              <a:rPr lang="en-US" b="0" i="0" dirty="0">
-                <a:effectLst/>
-                <a:latin typeface="ui-monospace"/>
-              </a:rPr>
-              <a:t>✓ 1 + 1 should equal 2 </a:t>
-            </a:r>
-          </a:p>
-          <a:p>
-            <a:pPr marL="180000" lvl="1" indent="0">
-              <a:buNone/>
-            </a:pPr>
-            <a:r>
-              <a:rPr lang="en-US" dirty="0">
-                <a:latin typeface="ui-monospace"/>
-              </a:rPr>
-              <a:t>	        </a:t>
-            </a:r>
-            <a:r>
-              <a:rPr lang="en-US" b="0" i="0" dirty="0">
-                <a:effectLst/>
-                <a:latin typeface="ui-monospace"/>
-              </a:rPr>
-              <a:t>✓ 2 - 1 should equal 1</a:t>
-            </a:r>
-            <a:endParaRPr lang="en-US" dirty="0">
-              <a:solidFill>
-                <a:srgbClr val="3C3C43"/>
-              </a:solidFill>
-              <a:latin typeface="+mj-lt"/>
-            </a:endParaRPr>
+              <a:t> (2)</a:t>
+            </a:r>
           </a:p>
           <a:p>
             <a:pPr marL="0" indent="0">
               <a:buNone/>
             </a:pPr>
-            <a:endParaRPr lang="nl-NL" dirty="0">
-              <a:latin typeface="ui-monospace"/>
-            </a:endParaRPr>
+            <a:r>
+              <a:rPr lang="nl-NL" dirty="0">
+                <a:latin typeface="ui-monospace"/>
+              </a:rPr>
+              <a:t>	          </a:t>
+            </a:r>
+            <a:r>
+              <a:rPr lang="nl-NL" b="0" i="0" dirty="0">
+                <a:effectLst/>
+                <a:latin typeface="ui-monospace"/>
+              </a:rPr>
+              <a:t>Tests 4 </a:t>
+            </a:r>
+            <a:r>
+              <a:rPr lang="nl-NL" b="0" i="0" dirty="0" err="1">
+                <a:effectLst/>
+                <a:latin typeface="ui-monospace"/>
+              </a:rPr>
+              <a:t>passed</a:t>
+            </a:r>
+            <a:r>
+              <a:rPr lang="nl-NL" b="0" i="0" dirty="0">
+                <a:effectLst/>
+                <a:latin typeface="ui-monospace"/>
+              </a:rPr>
+              <a:t> (4)</a:t>
+            </a:r>
           </a:p>
           <a:p>
             <a:pPr marL="0" indent="0">
@@ -15606,90 +15709,14 @@
               <a:rPr lang="nl-NL" dirty="0">
                 <a:latin typeface="ui-monospace"/>
               </a:rPr>
-              <a:t>	  </a:t>
+              <a:t>	       </a:t>
             </a:r>
             <a:r>
               <a:rPr lang="nl-NL" b="0" i="0" dirty="0">
                 <a:effectLst/>
                 <a:latin typeface="ui-monospace"/>
               </a:rPr>
-              <a:t>Test Files 2 </a:t>
-            </a:r>
-            <a:r>
-              <a:rPr lang="nl-NL" b="0" i="0" dirty="0" err="1">
-                <a:effectLst/>
-                <a:latin typeface="ui-monospace"/>
-              </a:rPr>
-              <a:t>passed</a:t>
-            </a:r>
-            <a:r>
-              <a:rPr lang="nl-NL" b="0" i="0" dirty="0">
-                <a:effectLst/>
-                <a:latin typeface="ui-monospace"/>
-              </a:rPr>
-              <a:t> (2)</a:t>
-            </a:r>
-          </a:p>
-          <a:p>
-            <a:pPr marL="0" indent="0">
-              <a:buNone/>
-            </a:pPr>
-            <a:r>
-              <a:rPr lang="nl-NL" dirty="0">
-                <a:latin typeface="ui-monospace"/>
-              </a:rPr>
-              <a:t>	          </a:t>
-            </a:r>
-            <a:r>
-              <a:rPr lang="nl-NL" b="0" i="0" dirty="0">
-                <a:effectLst/>
-                <a:latin typeface="ui-monospace"/>
-              </a:rPr>
-              <a:t>Tests 4 </a:t>
-            </a:r>
-            <a:r>
-              <a:rPr lang="nl-NL" b="0" i="0" dirty="0" err="1">
-                <a:effectLst/>
-                <a:latin typeface="ui-monospace"/>
-              </a:rPr>
-              <a:t>passed</a:t>
-            </a:r>
-            <a:r>
-              <a:rPr lang="nl-NL" b="0" i="0" dirty="0">
-                <a:effectLst/>
-                <a:latin typeface="ui-monospace"/>
-              </a:rPr>
-              <a:t> (4)</a:t>
-            </a:r>
-          </a:p>
-          <a:p>
-            <a:pPr marL="0" indent="0">
-              <a:buNone/>
-            </a:pPr>
-            <a:r>
-              <a:rPr lang="nl-NL" dirty="0">
-                <a:latin typeface="ui-monospace"/>
-              </a:rPr>
-              <a:t>	       </a:t>
-            </a:r>
-            <a:r>
-              <a:rPr lang="nl-NL" b="0" i="0" dirty="0">
-                <a:effectLst/>
-                <a:latin typeface="ui-monospace"/>
-              </a:rPr>
-              <a:t>Start at 12:34:32</a:t>
-            </a:r>
-          </a:p>
-          <a:p>
-            <a:pPr marL="0" indent="0">
-              <a:buNone/>
-            </a:pPr>
-            <a:r>
-              <a:rPr lang="nl-NL" b="0" i="0" dirty="0">
-                <a:effectLst/>
-                <a:latin typeface="ui-monospace"/>
-              </a:rPr>
-              <a:t>	       </a:t>
+              <a:t>Start at 12:34:32 </a:t>
             </a:r>
             <a:r>
               <a:rPr lang="nl-NL" b="0" i="0" dirty="0" err="1">
@@ -15779,7 +15806,7 @@
     </p:spTree>
     <p:extLst>
       <p:ext uri="{BB962C8B-B14F-4D97-AF65-F5344CB8AC3E}">
-        <p14:creationId xmlns:p14="http://schemas.microsoft.com/office/powerpoint/2010/main" val="4239046025"/>
+        <p14:creationId xmlns:p14="http://schemas.microsoft.com/office/powerpoint/2010/main" val="3941090643"/>
       </p:ext>
     </p:extLst>
   </p:cSld>
@@ -44381,21 +44408,6 @@
 </file>
 
 <file path=customXml/item1.xml><?xml version="1.0" encoding="utf-8"?>
-<?mso-contentType ?>
-<FormTemplates xmlns="http://schemas.microsoft.com/sharepoint/v3/contenttype/forms">
-  <Display>DocumentLibraryForm</Display>
-  <Edit>DocumentLibraryForm</Edit>
-  <New>DocumentLibraryForm</New>
-</FormTemplates>
-</file>
-
-<file path=customXml/item2.xml><?xml version="1.0" encoding="utf-8"?>
-<p:properties xmlns:p="http://schemas.microsoft.com/office/2006/metadata/properties" xmlns:xsi="http://www.w3.org/2001/XMLSchema-instance" xmlns:pc="http://schemas.microsoft.com/office/infopath/2007/PartnerControls">
-  <documentManagement/>
-</p:properties>
-</file>
-
-<file path=customXml/item3.xml><?xml version="1.0" encoding="utf-8"?>
 <ct:contentTypeSchema xmlns:ct="http://schemas.microsoft.com/office/2006/metadata/contentType" xmlns:ma="http://schemas.microsoft.com/office/2006/metadata/properties/metaAttributes" ct:_="" ma:_="" ma:contentTypeName="Document" ma:contentTypeID="0x010100E60B9E64A7B90B499F767EB2F0BD9B16" ma:contentTypeVersion="6" ma:contentTypeDescription="Een nieuw document maken." ma:contentTypeScope="" ma:versionID="b06164b3fd5da11ca9f7bb1b82024672">
   <xsd:schema xmlns:xsd="http://www.w3.org/2001/XMLSchema" xmlns:xs="http://www.w3.org/2001/XMLSchema" xmlns:p="http://schemas.microsoft.com/office/2006/metadata/properties" xmlns:ns2="bd3a200e-a112-4432-b134-79c9e3991b87" xmlns:ns3="a74c57c6-afd1-46a5-a503-29300b13d321" targetNamespace="http://schemas.microsoft.com/office/2006/metadata/properties" ma:root="true" ma:fieldsID="12483fe1a591bf0ffa72e05baf87ef3d" ns2:_="" ns3:_="">
     <xsd:import namespace="bd3a200e-a112-4432-b134-79c9e3991b87"/>
@@ -44572,24 +44584,22 @@
 </ct:contentTypeSchema>
 </file>
 
-<file path=customXml/itemProps1.xml><?xml version="1.0" encoding="utf-8"?>
-<ds:datastoreItem xmlns:ds="http://schemas.openxmlformats.org/officeDocument/2006/customXml" ds:itemID="{15DF2822-16E4-4479-B239-41A079CBB65B}">
-  <ds:schemaRefs>
-    <ds:schemaRef ds:uri="http://schemas.microsoft.com/sharepoint/v3/contenttype/forms"/>
-  </ds:schemaRefs>
-</ds:datastoreItem>
+<file path=customXml/item2.xml><?xml version="1.0" encoding="utf-8"?>
+<?mso-contentType ?>
+<FormTemplates xmlns="http://schemas.microsoft.com/sharepoint/v3/contenttype/forms">
+  <Display>DocumentLibraryForm</Display>
+  <Edit>DocumentLibraryForm</Edit>
+  <New>DocumentLibraryForm</New>
+</FormTemplates>
 </file>
 
-<file path=customXml/itemProps2.xml><?xml version="1.0" encoding="utf-8"?>
-<ds:datastoreItem xmlns:ds="http://schemas.openxmlformats.org/officeDocument/2006/customXml" ds:itemID="{63653586-D9AD-4A7C-AE25-8F164514A81A}">
-  <ds:schemaRefs>
-    <ds:schemaRef ds:uri="http://schemas.microsoft.com/office/2006/metadata/properties"/>
-    <ds:schemaRef ds:uri="http://schemas.microsoft.com/office/infopath/2007/PartnerControls"/>
-  </ds:schemaRefs>
-</ds:datastoreItem>
+<file path=customXml/item3.xml><?xml version="1.0" encoding="utf-8"?>
+<p:properties xmlns:p="http://schemas.microsoft.com/office/2006/metadata/properties" xmlns:xsi="http://www.w3.org/2001/XMLSchema-instance" xmlns:pc="http://schemas.microsoft.com/office/infopath/2007/PartnerControls">
+  <documentManagement/>
+</p:properties>
 </file>
 
-<file path=customXml/itemProps3.xml><?xml version="1.0" encoding="utf-8"?>
+<file path=customXml/itemProps1.xml><?xml version="1.0" encoding="utf-8"?>
 <ds:datastoreItem xmlns:ds="http://schemas.openxmlformats.org/officeDocument/2006/customXml" ds:itemID="{3820B2B8-E73A-4CEA-B66F-D4C256B09F5E}">
   <ds:schemaRefs>
     <ds:schemaRef ds:uri="http://schemas.microsoft.com/office/2006/metadata/contentType"/>
@@ -44606,4 +44616,21 @@
     <ds:schemaRef ds:uri="http://schemas.microsoft.com/internal/obd"/>
   </ds:schemaRefs>
 </ds:datastoreItem>
+</file>
+
+<file path=customXml/itemProps2.xml><?xml version="1.0" encoding="utf-8"?>
+<ds:datastoreItem xmlns:ds="http://schemas.openxmlformats.org/officeDocument/2006/customXml" ds:itemID="{15DF2822-16E4-4479-B239-41A079CBB65B}">
+  <ds:schemaRefs>
+    <ds:schemaRef ds:uri="http://schemas.microsoft.com/sharepoint/v3/contenttype/forms"/>
+  </ds:schemaRefs>
+</ds:datastoreItem>
+</file>
+
+<file path=customXml/itemProps3.xml><?xml version="1.0" encoding="utf-8"?>
+<ds:datastoreItem xmlns:ds="http://schemas.openxmlformats.org/officeDocument/2006/customXml" ds:itemID="{63653586-D9AD-4A7C-AE25-8F164514A81A}">
+  <ds:schemaRefs>
+    <ds:schemaRef ds:uri="http://schemas.microsoft.com/office/2006/metadata/properties"/>
+    <ds:schemaRef ds:uri="http://schemas.microsoft.com/office/infopath/2007/PartnerControls"/>
+  </ds:schemaRefs>
+</ds:datastoreItem>
 </file>
</xml_diff>